<commit_message>
removed a typo in the powerpoint
</commit_message>
<xml_diff>
--- a/UserGuides/DatabaseDifferenceCheckerDefense.pptx
+++ b/UserGuides/DatabaseDifferenceCheckerDefense.pptx
@@ -409,7 +409,7 @@
           <a:p>
             <a:fld id="{3B814E32-64BB-4D86-8A12-BAFE6E84B766}" type="datetimeFigureOut">
               <a:rPr lang="en-US" smtClean="0"/>
-              <a:t>3/10/2020</a:t>
+              <a:t>4/8/2020</a:t>
             </a:fld>
             <a:endParaRPr lang="en-US"/>
           </a:p>
@@ -617,7 +617,7 @@
           <a:p>
             <a:fld id="{3B814E32-64BB-4D86-8A12-BAFE6E84B766}" type="datetimeFigureOut">
               <a:rPr lang="en-US" smtClean="0"/>
-              <a:t>3/10/2020</a:t>
+              <a:t>4/8/2020</a:t>
             </a:fld>
             <a:endParaRPr lang="en-US"/>
           </a:p>
@@ -873,7 +873,7 @@
           <a:p>
             <a:fld id="{3B814E32-64BB-4D86-8A12-BAFE6E84B766}" type="datetimeFigureOut">
               <a:rPr lang="en-US" smtClean="0"/>
-              <a:t>3/10/2020</a:t>
+              <a:t>4/8/2020</a:t>
             </a:fld>
             <a:endParaRPr lang="en-US"/>
           </a:p>
@@ -1047,7 +1047,7 @@
           <a:p>
             <a:fld id="{3B814E32-64BB-4D86-8A12-BAFE6E84B766}" type="datetimeFigureOut">
               <a:rPr lang="en-US" smtClean="0"/>
-              <a:t>3/10/2020</a:t>
+              <a:t>4/8/2020</a:t>
             </a:fld>
             <a:endParaRPr lang="en-US"/>
           </a:p>
@@ -1390,7 +1390,7 @@
           <a:p>
             <a:fld id="{3B814E32-64BB-4D86-8A12-BAFE6E84B766}" type="datetimeFigureOut">
               <a:rPr lang="en-US" smtClean="0"/>
-              <a:t>3/10/2020</a:t>
+              <a:t>4/8/2020</a:t>
             </a:fld>
             <a:endParaRPr lang="en-US"/>
           </a:p>
@@ -1665,7 +1665,7 @@
           <a:p>
             <a:fld id="{3B814E32-64BB-4D86-8A12-BAFE6E84B766}" type="datetimeFigureOut">
               <a:rPr lang="en-US" smtClean="0"/>
-              <a:t>3/10/2020</a:t>
+              <a:t>4/8/2020</a:t>
             </a:fld>
             <a:endParaRPr lang="en-US"/>
           </a:p>
@@ -2044,7 +2044,7 @@
           <a:p>
             <a:fld id="{3B814E32-64BB-4D86-8A12-BAFE6E84B766}" type="datetimeFigureOut">
               <a:rPr lang="en-US" smtClean="0"/>
-              <a:t>3/10/2020</a:t>
+              <a:t>4/8/2020</a:t>
             </a:fld>
             <a:endParaRPr lang="en-US"/>
           </a:p>
@@ -2162,7 +2162,7 @@
           <a:p>
             <a:fld id="{3B814E32-64BB-4D86-8A12-BAFE6E84B766}" type="datetimeFigureOut">
               <a:rPr lang="en-US" smtClean="0"/>
-              <a:t>3/10/2020</a:t>
+              <a:t>4/8/2020</a:t>
             </a:fld>
             <a:endParaRPr lang="en-US"/>
           </a:p>
@@ -2333,7 +2333,7 @@
           <a:p>
             <a:fld id="{3B814E32-64BB-4D86-8A12-BAFE6E84B766}" type="datetimeFigureOut">
               <a:rPr lang="en-US" smtClean="0"/>
-              <a:t>3/10/2020</a:t>
+              <a:t>4/8/2020</a:t>
             </a:fld>
             <a:endParaRPr lang="en-US"/>
           </a:p>
@@ -2687,7 +2687,7 @@
           <a:p>
             <a:fld id="{3B814E32-64BB-4D86-8A12-BAFE6E84B766}" type="datetimeFigureOut">
               <a:rPr lang="en-US" smtClean="0"/>
-              <a:t>3/10/2020</a:t>
+              <a:t>4/8/2020</a:t>
             </a:fld>
             <a:endParaRPr lang="en-US"/>
           </a:p>
@@ -3069,7 +3069,7 @@
           <a:p>
             <a:fld id="{3B814E32-64BB-4D86-8A12-BAFE6E84B766}" type="datetimeFigureOut">
               <a:rPr lang="en-US" smtClean="0"/>
-              <a:t>3/10/2020</a:t>
+              <a:t>4/8/2020</a:t>
             </a:fld>
             <a:endParaRPr lang="en-US"/>
           </a:p>
@@ -3356,7 +3356,7 @@
           <a:p>
             <a:fld id="{3B814E32-64BB-4D86-8A12-BAFE6E84B766}" type="datetimeFigureOut">
               <a:rPr lang="en-US" smtClean="0"/>
-              <a:t>3/10/2020</a:t>
+              <a:t>4/8/2020</a:t>
             </a:fld>
             <a:endParaRPr lang="en-US"/>
           </a:p>
@@ -3987,6 +3987,13 @@
   <p:clrMapOvr>
     <a:masterClrMapping/>
   </p:clrMapOvr>
+  <p:timing>
+    <p:tnLst>
+      <p:par>
+        <p:cTn id="1" dur="indefinite" restart="never" nodeType="tmRoot"/>
+      </p:par>
+    </p:tnLst>
+  </p:timing>
 </p:sld>
 </file>
 
@@ -4069,6 +4076,13 @@
   <p:clrMapOvr>
     <a:masterClrMapping/>
   </p:clrMapOvr>
+  <p:timing>
+    <p:tnLst>
+      <p:par>
+        <p:cTn id="1" dur="indefinite" restart="never" nodeType="tmRoot"/>
+      </p:par>
+    </p:tnLst>
+  </p:timing>
 </p:sld>
 </file>
 
@@ -4151,6 +4165,13 @@
   <p:clrMapOvr>
     <a:masterClrMapping/>
   </p:clrMapOvr>
+  <p:timing>
+    <p:tnLst>
+      <p:par>
+        <p:cTn id="1" dur="indefinite" restart="never" nodeType="tmRoot"/>
+      </p:par>
+    </p:tnLst>
+  </p:timing>
 </p:sld>
 </file>
 
@@ -4204,7 +4225,12 @@
             <p:ph sz="half" idx="1"/>
           </p:nvPr>
         </p:nvSpPr>
-        <p:spPr/>
+        <p:spPr>
+          <a:xfrm>
+            <a:off x="1097279" y="1845733"/>
+            <a:ext cx="4937760" cy="4023361"/>
+          </a:xfrm>
+        </p:spPr>
         <p:txBody>
           <a:bodyPr>
             <a:normAutofit/>
@@ -4374,6 +4400,13 @@
   <p:clrMapOvr>
     <a:masterClrMapping/>
   </p:clrMapOvr>
+  <p:timing>
+    <p:tnLst>
+      <p:par>
+        <p:cTn id="1" dur="indefinite" restart="never" nodeType="tmRoot"/>
+      </p:par>
+    </p:tnLst>
+  </p:timing>
 </p:sld>
 </file>
 
@@ -4566,7 +4599,12 @@
             <p:ph sz="quarter" idx="4"/>
           </p:nvPr>
         </p:nvSpPr>
-        <p:spPr/>
+        <p:spPr>
+          <a:xfrm>
+            <a:off x="6217920" y="2582334"/>
+            <a:ext cx="4937760" cy="3378200"/>
+          </a:xfrm>
+        </p:spPr>
         <p:txBody>
           <a:bodyPr/>
           <a:lstStyle/>
@@ -4615,7 +4653,15 @@
             </a:pPr>
             <a:r>
               <a:rPr lang="en-US" dirty="0" smtClean="0"/>
-              <a:t>Had to se `shell=True`</a:t>
+              <a:t>Had to </a:t>
+            </a:r>
+            <a:r>
+              <a:rPr lang="en-US" dirty="0" smtClean="0"/>
+              <a:t>be </a:t>
+            </a:r>
+            <a:r>
+              <a:rPr lang="en-US" dirty="0" smtClean="0"/>
+              <a:t>`shell=True`</a:t>
             </a:r>
           </a:p>
           <a:p>
@@ -4669,6 +4715,13 @@
   <p:clrMapOvr>
     <a:masterClrMapping/>
   </p:clrMapOvr>
+  <p:timing>
+    <p:tnLst>
+      <p:par>
+        <p:cTn id="1" dur="indefinite" restart="never" nodeType="tmRoot"/>
+      </p:par>
+    </p:tnLst>
+  </p:timing>
 </p:sld>
 </file>
 
@@ -4811,6 +4864,13 @@
   <p:clrMapOvr>
     <a:masterClrMapping/>
   </p:clrMapOvr>
+  <p:timing>
+    <p:tnLst>
+      <p:par>
+        <p:cTn id="1" dur="indefinite" restart="never" nodeType="tmRoot"/>
+      </p:par>
+    </p:tnLst>
+  </p:timing>
 </p:sld>
 </file>
 
@@ -4964,6 +5024,13 @@
   <p:clrMapOvr>
     <a:masterClrMapping/>
   </p:clrMapOvr>
+  <p:timing>
+    <p:tnLst>
+      <p:par>
+        <p:cTn id="1" dur="indefinite" restart="never" nodeType="tmRoot"/>
+      </p:par>
+    </p:tnLst>
+  </p:timing>
 </p:sld>
 </file>
 
@@ -5044,6 +5111,13 @@
   <p:clrMapOvr>
     <a:masterClrMapping/>
   </p:clrMapOvr>
+  <p:timing>
+    <p:tnLst>
+      <p:par>
+        <p:cTn id="1" dur="indefinite" restart="never" nodeType="tmRoot"/>
+      </p:par>
+    </p:tnLst>
+  </p:timing>
 </p:sld>
 </file>
 
@@ -5259,6 +5333,13 @@
   <p:clrMapOvr>
     <a:masterClrMapping/>
   </p:clrMapOvr>
+  <p:timing>
+    <p:tnLst>
+      <p:par>
+        <p:cTn id="1" dur="indefinite" restart="never" nodeType="tmRoot"/>
+      </p:par>
+    </p:tnLst>
+  </p:timing>
 </p:sld>
 </file>
 
@@ -5469,6 +5550,13 @@
   <p:clrMapOvr>
     <a:masterClrMapping/>
   </p:clrMapOvr>
+  <p:timing>
+    <p:tnLst>
+      <p:par>
+        <p:cTn id="1" dur="indefinite" restart="never" nodeType="tmRoot"/>
+      </p:par>
+    </p:tnLst>
+  </p:timing>
 </p:sld>
 </file>
 
@@ -5598,7 +5686,6 @@
               <a:rPr lang="en-US" sz="2000" dirty="0"/>
               <a:t>- NA </a:t>
             </a:r>
-            <a:endParaRPr lang="en-US" sz="2000" dirty="0"/>
           </a:p>
           <a:p>
             <a:pPr lvl="2"/>
@@ -5641,6 +5728,13 @@
   <p:clrMapOvr>
     <a:masterClrMapping/>
   </p:clrMapOvr>
+  <p:timing>
+    <p:tnLst>
+      <p:par>
+        <p:cTn id="1" dur="indefinite" restart="never" nodeType="tmRoot"/>
+      </p:par>
+    </p:tnLst>
+  </p:timing>
 </p:sld>
 </file>
 
@@ -5808,6 +5902,13 @@
   <p:clrMapOvr>
     <a:masterClrMapping/>
   </p:clrMapOvr>
+  <p:timing>
+    <p:tnLst>
+      <p:par>
+        <p:cTn id="1" dur="indefinite" restart="never" nodeType="tmRoot"/>
+      </p:par>
+    </p:tnLst>
+  </p:timing>
 </p:sld>
 </file>
 
@@ -5890,6 +5991,13 @@
   <p:clrMapOvr>
     <a:masterClrMapping/>
   </p:clrMapOvr>
+  <p:timing>
+    <p:tnLst>
+      <p:par>
+        <p:cTn id="1" dur="indefinite" restart="never" nodeType="tmRoot"/>
+      </p:par>
+    </p:tnLst>
+  </p:timing>
 </p:sld>
 </file>
 
@@ -5978,8 +6086,8 @@
         </p:blipFill>
         <p:spPr>
           <a:xfrm>
-            <a:off x="6519331" y="1930652"/>
-            <a:ext cx="4648200" cy="4023003"/>
+            <a:off x="6519331" y="1930930"/>
+            <a:ext cx="4648200" cy="4022725"/>
           </a:xfrm>
           <a:prstGeom prst="rect">
             <a:avLst/>
@@ -5996,6 +6104,13 @@
   <p:clrMapOvr>
     <a:masterClrMapping/>
   </p:clrMapOvr>
+  <p:timing>
+    <p:tnLst>
+      <p:par>
+        <p:cTn id="1" dur="indefinite" restart="never" nodeType="tmRoot"/>
+      </p:par>
+    </p:tnLst>
+  </p:timing>
 </p:sld>
 </file>
 
@@ -6102,6 +6217,13 @@
   <p:clrMapOvr>
     <a:masterClrMapping/>
   </p:clrMapOvr>
+  <p:timing>
+    <p:tnLst>
+      <p:par>
+        <p:cTn id="1" dur="indefinite" restart="never" nodeType="tmRoot"/>
+      </p:par>
+    </p:tnLst>
+  </p:timing>
 </p:sld>
 </file>
 
@@ -6190,8 +6312,8 @@
         </p:blipFill>
         <p:spPr>
           <a:xfrm>
-            <a:off x="6511343" y="1846263"/>
-            <a:ext cx="4644337" cy="4019660"/>
+            <a:off x="6511343" y="1846262"/>
+            <a:ext cx="4644337" cy="4022725"/>
           </a:xfrm>
           <a:prstGeom prst="rect">
             <a:avLst/>
@@ -6208,6 +6330,13 @@
   <p:clrMapOvr>
     <a:masterClrMapping/>
   </p:clrMapOvr>
+  <p:timing>
+    <p:tnLst>
+      <p:par>
+        <p:cTn id="1" dur="indefinite" restart="never" nodeType="tmRoot"/>
+      </p:par>
+    </p:tnLst>
+  </p:timing>
 </p:sld>
 </file>
 

</xml_diff>